<commit_message>
Replace images with CC versions
</commit_message>
<xml_diff>
--- a/units/2/lessons/5/resources/petascale-lesson-2.5-slides.pptx
+++ b/units/2/lessons/5/resources/petascale-lesson-2.5-slides.pptx
@@ -212,7 +212,7 @@
           <a:p>
             <a:fld id="{1F9E61A1-21F8-1C4E-8714-275020CD1E84}" type="datetimeFigureOut">
               <a:rPr lang="en-US" smtClean="0"/>
-              <a:t>10/11/20</a:t>
+              <a:t>11/16/20</a:t>
             </a:fld>
             <a:endParaRPr lang="en-US"/>
           </a:p>
@@ -848,7 +848,7 @@
           <p:cNvPr id="2" name="Title 1">
             <a:extLst>
               <a:ext uri="{FF2B5EF4-FFF2-40B4-BE49-F238E27FC236}">
-                <a16:creationId xmlns="" xmlns:a16="http://schemas.microsoft.com/office/drawing/2014/main" id="{ECCD4231-516E-4F44-A17B-3F054DEC3749}"/>
+                <a16:creationId xmlns:a16="http://schemas.microsoft.com/office/drawing/2014/main" xmlns="" id="{ECCD4231-516E-4F44-A17B-3F054DEC3749}"/>
               </a:ext>
             </a:extLst>
           </p:cNvPr>
@@ -885,7 +885,7 @@
           <p:cNvPr id="3" name="Subtitle 2">
             <a:extLst>
               <a:ext uri="{FF2B5EF4-FFF2-40B4-BE49-F238E27FC236}">
-                <a16:creationId xmlns="" xmlns:a16="http://schemas.microsoft.com/office/drawing/2014/main" id="{9AAAE986-0001-8843-AA0C-EF11C02C99D5}"/>
+                <a16:creationId xmlns:a16="http://schemas.microsoft.com/office/drawing/2014/main" xmlns="" id="{9AAAE986-0001-8843-AA0C-EF11C02C99D5}"/>
               </a:ext>
             </a:extLst>
           </p:cNvPr>
@@ -955,7 +955,7 @@
           <p:cNvPr id="4" name="Date Placeholder 3">
             <a:extLst>
               <a:ext uri="{FF2B5EF4-FFF2-40B4-BE49-F238E27FC236}">
-                <a16:creationId xmlns="" xmlns:a16="http://schemas.microsoft.com/office/drawing/2014/main" id="{D9D63896-6ED9-6C46-B3B3-685E831C8A20}"/>
+                <a16:creationId xmlns:a16="http://schemas.microsoft.com/office/drawing/2014/main" xmlns="" id="{D9D63896-6ED9-6C46-B3B3-685E831C8A20}"/>
               </a:ext>
             </a:extLst>
           </p:cNvPr>
@@ -973,7 +973,7 @@
           <a:p>
             <a:fld id="{2AD54A35-3D00-9346-A90C-D5D0667B371F}" type="datetimeFigureOut">
               <a:rPr lang="en-US" smtClean="0"/>
-              <a:t>10/11/20</a:t>
+              <a:t>11/16/20</a:t>
             </a:fld>
             <a:endParaRPr lang="en-US"/>
           </a:p>
@@ -984,7 +984,7 @@
           <p:cNvPr id="5" name="Footer Placeholder 4">
             <a:extLst>
               <a:ext uri="{FF2B5EF4-FFF2-40B4-BE49-F238E27FC236}">
-                <a16:creationId xmlns="" xmlns:a16="http://schemas.microsoft.com/office/drawing/2014/main" id="{C10BB2E9-6A81-2145-B040-ED2C4437BADE}"/>
+                <a16:creationId xmlns:a16="http://schemas.microsoft.com/office/drawing/2014/main" xmlns="" id="{C10BB2E9-6A81-2145-B040-ED2C4437BADE}"/>
               </a:ext>
             </a:extLst>
           </p:cNvPr>
@@ -1009,7 +1009,7 @@
           <p:cNvPr id="6" name="Slide Number Placeholder 5">
             <a:extLst>
               <a:ext uri="{FF2B5EF4-FFF2-40B4-BE49-F238E27FC236}">
-                <a16:creationId xmlns="" xmlns:a16="http://schemas.microsoft.com/office/drawing/2014/main" id="{D98D17D2-DA72-A743-9E80-2DE7E411C371}"/>
+                <a16:creationId xmlns:a16="http://schemas.microsoft.com/office/drawing/2014/main" xmlns="" id="{D98D17D2-DA72-A743-9E80-2DE7E411C371}"/>
               </a:ext>
             </a:extLst>
           </p:cNvPr>
@@ -1068,7 +1068,7 @@
           <p:cNvPr id="2" name="Title 1">
             <a:extLst>
               <a:ext uri="{FF2B5EF4-FFF2-40B4-BE49-F238E27FC236}">
-                <a16:creationId xmlns="" xmlns:a16="http://schemas.microsoft.com/office/drawing/2014/main" id="{4A1F9254-60BE-DC42-9596-6D91A6259519}"/>
+                <a16:creationId xmlns:a16="http://schemas.microsoft.com/office/drawing/2014/main" xmlns="" id="{4A1F9254-60BE-DC42-9596-6D91A6259519}"/>
               </a:ext>
             </a:extLst>
           </p:cNvPr>
@@ -1096,7 +1096,7 @@
           <p:cNvPr id="3" name="Vertical Text Placeholder 2">
             <a:extLst>
               <a:ext uri="{FF2B5EF4-FFF2-40B4-BE49-F238E27FC236}">
-                <a16:creationId xmlns="" xmlns:a16="http://schemas.microsoft.com/office/drawing/2014/main" id="{4F14CE1F-628E-9042-9206-67E9845A0A66}"/>
+                <a16:creationId xmlns:a16="http://schemas.microsoft.com/office/drawing/2014/main" xmlns="" id="{4F14CE1F-628E-9042-9206-67E9845A0A66}"/>
               </a:ext>
             </a:extLst>
           </p:cNvPr>
@@ -1153,7 +1153,7 @@
           <p:cNvPr id="4" name="Date Placeholder 3">
             <a:extLst>
               <a:ext uri="{FF2B5EF4-FFF2-40B4-BE49-F238E27FC236}">
-                <a16:creationId xmlns="" xmlns:a16="http://schemas.microsoft.com/office/drawing/2014/main" id="{60E30384-8CEC-ED46-9688-34F619E3B67D}"/>
+                <a16:creationId xmlns:a16="http://schemas.microsoft.com/office/drawing/2014/main" xmlns="" id="{60E30384-8CEC-ED46-9688-34F619E3B67D}"/>
               </a:ext>
             </a:extLst>
           </p:cNvPr>
@@ -1171,7 +1171,7 @@
           <a:p>
             <a:fld id="{2AD54A35-3D00-9346-A90C-D5D0667B371F}" type="datetimeFigureOut">
               <a:rPr lang="en-US" smtClean="0"/>
-              <a:t>10/11/20</a:t>
+              <a:t>11/16/20</a:t>
             </a:fld>
             <a:endParaRPr lang="en-US"/>
           </a:p>
@@ -1182,7 +1182,7 @@
           <p:cNvPr id="5" name="Footer Placeholder 4">
             <a:extLst>
               <a:ext uri="{FF2B5EF4-FFF2-40B4-BE49-F238E27FC236}">
-                <a16:creationId xmlns="" xmlns:a16="http://schemas.microsoft.com/office/drawing/2014/main" id="{BE7DF76B-2F0B-2C42-9486-459AF6251F6C}"/>
+                <a16:creationId xmlns:a16="http://schemas.microsoft.com/office/drawing/2014/main" xmlns="" id="{BE7DF76B-2F0B-2C42-9486-459AF6251F6C}"/>
               </a:ext>
             </a:extLst>
           </p:cNvPr>
@@ -1207,7 +1207,7 @@
           <p:cNvPr id="6" name="Slide Number Placeholder 5">
             <a:extLst>
               <a:ext uri="{FF2B5EF4-FFF2-40B4-BE49-F238E27FC236}">
-                <a16:creationId xmlns="" xmlns:a16="http://schemas.microsoft.com/office/drawing/2014/main" id="{F21C5003-F49F-D740-A093-6378E87D40B1}"/>
+                <a16:creationId xmlns:a16="http://schemas.microsoft.com/office/drawing/2014/main" xmlns="" id="{F21C5003-F49F-D740-A093-6378E87D40B1}"/>
               </a:ext>
             </a:extLst>
           </p:cNvPr>
@@ -1266,7 +1266,7 @@
           <p:cNvPr id="2" name="Vertical Title 1">
             <a:extLst>
               <a:ext uri="{FF2B5EF4-FFF2-40B4-BE49-F238E27FC236}">
-                <a16:creationId xmlns="" xmlns:a16="http://schemas.microsoft.com/office/drawing/2014/main" id="{D868CAA1-F34C-BC48-B614-2DDE3BDD9513}"/>
+                <a16:creationId xmlns:a16="http://schemas.microsoft.com/office/drawing/2014/main" xmlns="" id="{D868CAA1-F34C-BC48-B614-2DDE3BDD9513}"/>
               </a:ext>
             </a:extLst>
           </p:cNvPr>
@@ -1299,7 +1299,7 @@
           <p:cNvPr id="3" name="Vertical Text Placeholder 2">
             <a:extLst>
               <a:ext uri="{FF2B5EF4-FFF2-40B4-BE49-F238E27FC236}">
-                <a16:creationId xmlns="" xmlns:a16="http://schemas.microsoft.com/office/drawing/2014/main" id="{055AFBE0-A990-E541-973F-DF66990A6AA2}"/>
+                <a16:creationId xmlns:a16="http://schemas.microsoft.com/office/drawing/2014/main" xmlns="" id="{055AFBE0-A990-E541-973F-DF66990A6AA2}"/>
               </a:ext>
             </a:extLst>
           </p:cNvPr>
@@ -1361,7 +1361,7 @@
           <p:cNvPr id="4" name="Date Placeholder 3">
             <a:extLst>
               <a:ext uri="{FF2B5EF4-FFF2-40B4-BE49-F238E27FC236}">
-                <a16:creationId xmlns="" xmlns:a16="http://schemas.microsoft.com/office/drawing/2014/main" id="{8FF6782F-122B-4747-91A7-9021A291FAF2}"/>
+                <a16:creationId xmlns:a16="http://schemas.microsoft.com/office/drawing/2014/main" xmlns="" id="{8FF6782F-122B-4747-91A7-9021A291FAF2}"/>
               </a:ext>
             </a:extLst>
           </p:cNvPr>
@@ -1379,7 +1379,7 @@
           <a:p>
             <a:fld id="{2AD54A35-3D00-9346-A90C-D5D0667B371F}" type="datetimeFigureOut">
               <a:rPr lang="en-US" smtClean="0"/>
-              <a:t>10/11/20</a:t>
+              <a:t>11/16/20</a:t>
             </a:fld>
             <a:endParaRPr lang="en-US"/>
           </a:p>
@@ -1390,7 +1390,7 @@
           <p:cNvPr id="5" name="Footer Placeholder 4">
             <a:extLst>
               <a:ext uri="{FF2B5EF4-FFF2-40B4-BE49-F238E27FC236}">
-                <a16:creationId xmlns="" xmlns:a16="http://schemas.microsoft.com/office/drawing/2014/main" id="{A0B635ED-E1EE-954D-80AC-28B91C53CC4B}"/>
+                <a16:creationId xmlns:a16="http://schemas.microsoft.com/office/drawing/2014/main" xmlns="" id="{A0B635ED-E1EE-954D-80AC-28B91C53CC4B}"/>
               </a:ext>
             </a:extLst>
           </p:cNvPr>
@@ -1415,7 +1415,7 @@
           <p:cNvPr id="6" name="Slide Number Placeholder 5">
             <a:extLst>
               <a:ext uri="{FF2B5EF4-FFF2-40B4-BE49-F238E27FC236}">
-                <a16:creationId xmlns="" xmlns:a16="http://schemas.microsoft.com/office/drawing/2014/main" id="{EA0DC4C0-BAF7-0547-9DBB-FCC6A512447F}"/>
+                <a16:creationId xmlns:a16="http://schemas.microsoft.com/office/drawing/2014/main" xmlns="" id="{EA0DC4C0-BAF7-0547-9DBB-FCC6A512447F}"/>
               </a:ext>
             </a:extLst>
           </p:cNvPr>
@@ -1590,7 +1590,7 @@
                 </a:solidFill>
               </a:rPr>
               <a:pPr/>
-              <a:t>10/11/20</a:t>
+              <a:t>11/16/20</a:t>
             </a:fld>
             <a:endParaRPr lang="en-US">
               <a:solidFill>
@@ -1788,7 +1788,7 @@
                 </a:solidFill>
               </a:rPr>
               <a:pPr/>
-              <a:t>10/11/20</a:t>
+              <a:t>11/16/20</a:t>
             </a:fld>
             <a:endParaRPr lang="en-US">
               <a:solidFill>
@@ -2062,7 +2062,7 @@
                 </a:solidFill>
               </a:rPr>
               <a:pPr/>
-              <a:t>10/11/20</a:t>
+              <a:t>11/16/20</a:t>
             </a:fld>
             <a:endParaRPr lang="en-US">
               <a:solidFill>
@@ -2322,7 +2322,7 @@
                 </a:solidFill>
               </a:rPr>
               <a:pPr/>
-              <a:t>10/11/20</a:t>
+              <a:t>11/16/20</a:t>
             </a:fld>
             <a:endParaRPr lang="en-US">
               <a:solidFill>
@@ -2717,7 +2717,7 @@
                 </a:solidFill>
               </a:rPr>
               <a:pPr/>
-              <a:t>10/11/20</a:t>
+              <a:t>11/16/20</a:t>
             </a:fld>
             <a:endParaRPr lang="en-US">
               <a:solidFill>
@@ -2863,7 +2863,7 @@
                 </a:solidFill>
               </a:rPr>
               <a:pPr/>
-              <a:t>10/11/20</a:t>
+              <a:t>11/16/20</a:t>
             </a:fld>
             <a:endParaRPr lang="en-US">
               <a:solidFill>
@@ -2986,7 +2986,7 @@
                 </a:solidFill>
               </a:rPr>
               <a:pPr/>
-              <a:t>10/11/20</a:t>
+              <a:t>11/16/20</a:t>
             </a:fld>
             <a:endParaRPr lang="en-US">
               <a:solidFill>
@@ -3291,7 +3291,7 @@
                 </a:solidFill>
               </a:rPr>
               <a:pPr/>
-              <a:t>10/11/20</a:t>
+              <a:t>11/16/20</a:t>
             </a:fld>
             <a:endParaRPr lang="en-US">
               <a:solidFill>
@@ -3395,7 +3395,7 @@
           <p:cNvPr id="2" name="Title 1">
             <a:extLst>
               <a:ext uri="{FF2B5EF4-FFF2-40B4-BE49-F238E27FC236}">
-                <a16:creationId xmlns="" xmlns:a16="http://schemas.microsoft.com/office/drawing/2014/main" id="{46605E52-CD93-FE48-BC96-DE9219BA47F9}"/>
+                <a16:creationId xmlns:a16="http://schemas.microsoft.com/office/drawing/2014/main" xmlns="" id="{46605E52-CD93-FE48-BC96-DE9219BA47F9}"/>
               </a:ext>
             </a:extLst>
           </p:cNvPr>
@@ -3423,7 +3423,7 @@
           <p:cNvPr id="3" name="Content Placeholder 2">
             <a:extLst>
               <a:ext uri="{FF2B5EF4-FFF2-40B4-BE49-F238E27FC236}">
-                <a16:creationId xmlns="" xmlns:a16="http://schemas.microsoft.com/office/drawing/2014/main" id="{4EAFB191-CD58-9145-9135-2CCD9780D3D5}"/>
+                <a16:creationId xmlns:a16="http://schemas.microsoft.com/office/drawing/2014/main" xmlns="" id="{4EAFB191-CD58-9145-9135-2CCD9780D3D5}"/>
               </a:ext>
             </a:extLst>
           </p:cNvPr>
@@ -3480,7 +3480,7 @@
           <p:cNvPr id="4" name="Date Placeholder 3">
             <a:extLst>
               <a:ext uri="{FF2B5EF4-FFF2-40B4-BE49-F238E27FC236}">
-                <a16:creationId xmlns="" xmlns:a16="http://schemas.microsoft.com/office/drawing/2014/main" id="{4087EA37-F36A-F34C-9E20-CDFD51DDE846}"/>
+                <a16:creationId xmlns:a16="http://schemas.microsoft.com/office/drawing/2014/main" xmlns="" id="{4087EA37-F36A-F34C-9E20-CDFD51DDE846}"/>
               </a:ext>
             </a:extLst>
           </p:cNvPr>
@@ -3498,7 +3498,7 @@
           <a:p>
             <a:fld id="{2AD54A35-3D00-9346-A90C-D5D0667B371F}" type="datetimeFigureOut">
               <a:rPr lang="en-US" smtClean="0"/>
-              <a:t>10/11/20</a:t>
+              <a:t>11/16/20</a:t>
             </a:fld>
             <a:endParaRPr lang="en-US"/>
           </a:p>
@@ -3509,7 +3509,7 @@
           <p:cNvPr id="5" name="Footer Placeholder 4">
             <a:extLst>
               <a:ext uri="{FF2B5EF4-FFF2-40B4-BE49-F238E27FC236}">
-                <a16:creationId xmlns="" xmlns:a16="http://schemas.microsoft.com/office/drawing/2014/main" id="{44E6EB55-D662-C841-8DA3-8D08408CE513}"/>
+                <a16:creationId xmlns:a16="http://schemas.microsoft.com/office/drawing/2014/main" xmlns="" id="{44E6EB55-D662-C841-8DA3-8D08408CE513}"/>
               </a:ext>
             </a:extLst>
           </p:cNvPr>
@@ -3534,7 +3534,7 @@
           <p:cNvPr id="6" name="Slide Number Placeholder 5">
             <a:extLst>
               <a:ext uri="{FF2B5EF4-FFF2-40B4-BE49-F238E27FC236}">
-                <a16:creationId xmlns="" xmlns:a16="http://schemas.microsoft.com/office/drawing/2014/main" id="{50B5AB6A-7FE4-434E-BF87-C44BFDEE6EB6}"/>
+                <a16:creationId xmlns:a16="http://schemas.microsoft.com/office/drawing/2014/main" xmlns="" id="{50B5AB6A-7FE4-434E-BF87-C44BFDEE6EB6}"/>
               </a:ext>
             </a:extLst>
           </p:cNvPr>
@@ -3770,7 +3770,7 @@
                 </a:solidFill>
               </a:rPr>
               <a:pPr/>
-              <a:t>10/11/20</a:t>
+              <a:t>11/16/20</a:t>
             </a:fld>
             <a:endParaRPr lang="en-US">
               <a:solidFill>
@@ -3968,7 +3968,7 @@
                 </a:solidFill>
               </a:rPr>
               <a:pPr/>
-              <a:t>10/11/20</a:t>
+              <a:t>11/16/20</a:t>
             </a:fld>
             <a:endParaRPr lang="en-US">
               <a:solidFill>
@@ -4176,7 +4176,7 @@
                 </a:solidFill>
               </a:rPr>
               <a:pPr/>
-              <a:t>10/11/20</a:t>
+              <a:t>11/16/20</a:t>
             </a:fld>
             <a:endParaRPr lang="en-US">
               <a:solidFill>
@@ -4280,7 +4280,7 @@
           <p:cNvPr id="2" name="Title 1">
             <a:extLst>
               <a:ext uri="{FF2B5EF4-FFF2-40B4-BE49-F238E27FC236}">
-                <a16:creationId xmlns="" xmlns:a16="http://schemas.microsoft.com/office/drawing/2014/main" id="{53F65BC1-0DC0-2C41-93FD-F8C8C50FAA84}"/>
+                <a16:creationId xmlns:a16="http://schemas.microsoft.com/office/drawing/2014/main" xmlns="" id="{53F65BC1-0DC0-2C41-93FD-F8C8C50FAA84}"/>
               </a:ext>
             </a:extLst>
           </p:cNvPr>
@@ -4317,7 +4317,7 @@
           <p:cNvPr id="3" name="Text Placeholder 2">
             <a:extLst>
               <a:ext uri="{FF2B5EF4-FFF2-40B4-BE49-F238E27FC236}">
-                <a16:creationId xmlns="" xmlns:a16="http://schemas.microsoft.com/office/drawing/2014/main" id="{6BD1B562-39D0-3744-891B-19235BBFA456}"/>
+                <a16:creationId xmlns:a16="http://schemas.microsoft.com/office/drawing/2014/main" xmlns="" id="{6BD1B562-39D0-3744-891B-19235BBFA456}"/>
               </a:ext>
             </a:extLst>
           </p:cNvPr>
@@ -4442,7 +4442,7 @@
           <p:cNvPr id="4" name="Date Placeholder 3">
             <a:extLst>
               <a:ext uri="{FF2B5EF4-FFF2-40B4-BE49-F238E27FC236}">
-                <a16:creationId xmlns="" xmlns:a16="http://schemas.microsoft.com/office/drawing/2014/main" id="{FA49440E-DCDC-3149-842E-0F66C821ADBB}"/>
+                <a16:creationId xmlns:a16="http://schemas.microsoft.com/office/drawing/2014/main" xmlns="" id="{FA49440E-DCDC-3149-842E-0F66C821ADBB}"/>
               </a:ext>
             </a:extLst>
           </p:cNvPr>
@@ -4460,7 +4460,7 @@
           <a:p>
             <a:fld id="{2AD54A35-3D00-9346-A90C-D5D0667B371F}" type="datetimeFigureOut">
               <a:rPr lang="en-US" smtClean="0"/>
-              <a:t>10/11/20</a:t>
+              <a:t>11/16/20</a:t>
             </a:fld>
             <a:endParaRPr lang="en-US"/>
           </a:p>
@@ -4471,7 +4471,7 @@
           <p:cNvPr id="5" name="Footer Placeholder 4">
             <a:extLst>
               <a:ext uri="{FF2B5EF4-FFF2-40B4-BE49-F238E27FC236}">
-                <a16:creationId xmlns="" xmlns:a16="http://schemas.microsoft.com/office/drawing/2014/main" id="{74B09CA7-E319-6D4D-BF5E-7B20922B5731}"/>
+                <a16:creationId xmlns:a16="http://schemas.microsoft.com/office/drawing/2014/main" xmlns="" id="{74B09CA7-E319-6D4D-BF5E-7B20922B5731}"/>
               </a:ext>
             </a:extLst>
           </p:cNvPr>
@@ -4496,7 +4496,7 @@
           <p:cNvPr id="6" name="Slide Number Placeholder 5">
             <a:extLst>
               <a:ext uri="{FF2B5EF4-FFF2-40B4-BE49-F238E27FC236}">
-                <a16:creationId xmlns="" xmlns:a16="http://schemas.microsoft.com/office/drawing/2014/main" id="{D0AF356E-592D-8340-B7DC-6D5B999574BC}"/>
+                <a16:creationId xmlns:a16="http://schemas.microsoft.com/office/drawing/2014/main" xmlns="" id="{D0AF356E-592D-8340-B7DC-6D5B999574BC}"/>
               </a:ext>
             </a:extLst>
           </p:cNvPr>
@@ -4555,7 +4555,7 @@
           <p:cNvPr id="2" name="Title 1">
             <a:extLst>
               <a:ext uri="{FF2B5EF4-FFF2-40B4-BE49-F238E27FC236}">
-                <a16:creationId xmlns="" xmlns:a16="http://schemas.microsoft.com/office/drawing/2014/main" id="{24A32E39-81CF-DC43-A360-EA61859400EF}"/>
+                <a16:creationId xmlns:a16="http://schemas.microsoft.com/office/drawing/2014/main" xmlns="" id="{24A32E39-81CF-DC43-A360-EA61859400EF}"/>
               </a:ext>
             </a:extLst>
           </p:cNvPr>
@@ -4583,7 +4583,7 @@
           <p:cNvPr id="3" name="Content Placeholder 2">
             <a:extLst>
               <a:ext uri="{FF2B5EF4-FFF2-40B4-BE49-F238E27FC236}">
-                <a16:creationId xmlns="" xmlns:a16="http://schemas.microsoft.com/office/drawing/2014/main" id="{AF5D43BF-31F9-3B4E-ACF9-14EABCB33ADE}"/>
+                <a16:creationId xmlns:a16="http://schemas.microsoft.com/office/drawing/2014/main" xmlns="" id="{AF5D43BF-31F9-3B4E-ACF9-14EABCB33ADE}"/>
               </a:ext>
             </a:extLst>
           </p:cNvPr>
@@ -4645,7 +4645,7 @@
           <p:cNvPr id="4" name="Content Placeholder 3">
             <a:extLst>
               <a:ext uri="{FF2B5EF4-FFF2-40B4-BE49-F238E27FC236}">
-                <a16:creationId xmlns="" xmlns:a16="http://schemas.microsoft.com/office/drawing/2014/main" id="{3A0F3FF4-521C-414F-A4F2-5476B138151F}"/>
+                <a16:creationId xmlns:a16="http://schemas.microsoft.com/office/drawing/2014/main" xmlns="" id="{3A0F3FF4-521C-414F-A4F2-5476B138151F}"/>
               </a:ext>
             </a:extLst>
           </p:cNvPr>
@@ -4707,7 +4707,7 @@
           <p:cNvPr id="5" name="Date Placeholder 4">
             <a:extLst>
               <a:ext uri="{FF2B5EF4-FFF2-40B4-BE49-F238E27FC236}">
-                <a16:creationId xmlns="" xmlns:a16="http://schemas.microsoft.com/office/drawing/2014/main" id="{6F6E7D1A-C5B3-5248-8EAF-E6E874E493AB}"/>
+                <a16:creationId xmlns:a16="http://schemas.microsoft.com/office/drawing/2014/main" xmlns="" id="{6F6E7D1A-C5B3-5248-8EAF-E6E874E493AB}"/>
               </a:ext>
             </a:extLst>
           </p:cNvPr>
@@ -4725,7 +4725,7 @@
           <a:p>
             <a:fld id="{2AD54A35-3D00-9346-A90C-D5D0667B371F}" type="datetimeFigureOut">
               <a:rPr lang="en-US" smtClean="0"/>
-              <a:t>10/11/20</a:t>
+              <a:t>11/16/20</a:t>
             </a:fld>
             <a:endParaRPr lang="en-US"/>
           </a:p>
@@ -4736,7 +4736,7 @@
           <p:cNvPr id="6" name="Footer Placeholder 5">
             <a:extLst>
               <a:ext uri="{FF2B5EF4-FFF2-40B4-BE49-F238E27FC236}">
-                <a16:creationId xmlns="" xmlns:a16="http://schemas.microsoft.com/office/drawing/2014/main" id="{98174B26-7F75-E243-818F-9A4C66B47117}"/>
+                <a16:creationId xmlns:a16="http://schemas.microsoft.com/office/drawing/2014/main" xmlns="" id="{98174B26-7F75-E243-818F-9A4C66B47117}"/>
               </a:ext>
             </a:extLst>
           </p:cNvPr>
@@ -4761,7 +4761,7 @@
           <p:cNvPr id="7" name="Slide Number Placeholder 6">
             <a:extLst>
               <a:ext uri="{FF2B5EF4-FFF2-40B4-BE49-F238E27FC236}">
-                <a16:creationId xmlns="" xmlns:a16="http://schemas.microsoft.com/office/drawing/2014/main" id="{7174E3BB-F00C-5246-A089-7AFCDFB3A46A}"/>
+                <a16:creationId xmlns:a16="http://schemas.microsoft.com/office/drawing/2014/main" xmlns="" id="{7174E3BB-F00C-5246-A089-7AFCDFB3A46A}"/>
               </a:ext>
             </a:extLst>
           </p:cNvPr>
@@ -4820,7 +4820,7 @@
           <p:cNvPr id="2" name="Title 1">
             <a:extLst>
               <a:ext uri="{FF2B5EF4-FFF2-40B4-BE49-F238E27FC236}">
-                <a16:creationId xmlns="" xmlns:a16="http://schemas.microsoft.com/office/drawing/2014/main" id="{EEF55CDB-8557-6B41-8E08-363EE40B9F4F}"/>
+                <a16:creationId xmlns:a16="http://schemas.microsoft.com/office/drawing/2014/main" xmlns="" id="{EEF55CDB-8557-6B41-8E08-363EE40B9F4F}"/>
               </a:ext>
             </a:extLst>
           </p:cNvPr>
@@ -4853,7 +4853,7 @@
           <p:cNvPr id="3" name="Text Placeholder 2">
             <a:extLst>
               <a:ext uri="{FF2B5EF4-FFF2-40B4-BE49-F238E27FC236}">
-                <a16:creationId xmlns="" xmlns:a16="http://schemas.microsoft.com/office/drawing/2014/main" id="{17AB7CA3-FDA4-1A43-8B38-05609B27E88C}"/>
+                <a16:creationId xmlns:a16="http://schemas.microsoft.com/office/drawing/2014/main" xmlns="" id="{17AB7CA3-FDA4-1A43-8B38-05609B27E88C}"/>
               </a:ext>
             </a:extLst>
           </p:cNvPr>
@@ -4924,7 +4924,7 @@
           <p:cNvPr id="4" name="Content Placeholder 3">
             <a:extLst>
               <a:ext uri="{FF2B5EF4-FFF2-40B4-BE49-F238E27FC236}">
-                <a16:creationId xmlns="" xmlns:a16="http://schemas.microsoft.com/office/drawing/2014/main" id="{B4607FF7-3258-6A4A-B616-C6C55B9D8408}"/>
+                <a16:creationId xmlns:a16="http://schemas.microsoft.com/office/drawing/2014/main" xmlns="" id="{B4607FF7-3258-6A4A-B616-C6C55B9D8408}"/>
               </a:ext>
             </a:extLst>
           </p:cNvPr>
@@ -4986,7 +4986,7 @@
           <p:cNvPr id="5" name="Text Placeholder 4">
             <a:extLst>
               <a:ext uri="{FF2B5EF4-FFF2-40B4-BE49-F238E27FC236}">
-                <a16:creationId xmlns="" xmlns:a16="http://schemas.microsoft.com/office/drawing/2014/main" id="{665FFB2E-2236-A645-96BE-56DCD9FF4BA2}"/>
+                <a16:creationId xmlns:a16="http://schemas.microsoft.com/office/drawing/2014/main" xmlns="" id="{665FFB2E-2236-A645-96BE-56DCD9FF4BA2}"/>
               </a:ext>
             </a:extLst>
           </p:cNvPr>
@@ -5057,7 +5057,7 @@
           <p:cNvPr id="6" name="Content Placeholder 5">
             <a:extLst>
               <a:ext uri="{FF2B5EF4-FFF2-40B4-BE49-F238E27FC236}">
-                <a16:creationId xmlns="" xmlns:a16="http://schemas.microsoft.com/office/drawing/2014/main" id="{C17216D8-36CA-DF47-8FC6-6745A0E729FA}"/>
+                <a16:creationId xmlns:a16="http://schemas.microsoft.com/office/drawing/2014/main" xmlns="" id="{C17216D8-36CA-DF47-8FC6-6745A0E729FA}"/>
               </a:ext>
             </a:extLst>
           </p:cNvPr>
@@ -5119,7 +5119,7 @@
           <p:cNvPr id="7" name="Date Placeholder 6">
             <a:extLst>
               <a:ext uri="{FF2B5EF4-FFF2-40B4-BE49-F238E27FC236}">
-                <a16:creationId xmlns="" xmlns:a16="http://schemas.microsoft.com/office/drawing/2014/main" id="{4A8B6918-46FB-6B43-AA86-E1E5E33935FA}"/>
+                <a16:creationId xmlns:a16="http://schemas.microsoft.com/office/drawing/2014/main" xmlns="" id="{4A8B6918-46FB-6B43-AA86-E1E5E33935FA}"/>
               </a:ext>
             </a:extLst>
           </p:cNvPr>
@@ -5137,7 +5137,7 @@
           <a:p>
             <a:fld id="{2AD54A35-3D00-9346-A90C-D5D0667B371F}" type="datetimeFigureOut">
               <a:rPr lang="en-US" smtClean="0"/>
-              <a:t>10/11/20</a:t>
+              <a:t>11/16/20</a:t>
             </a:fld>
             <a:endParaRPr lang="en-US"/>
           </a:p>
@@ -5148,7 +5148,7 @@
           <p:cNvPr id="8" name="Footer Placeholder 7">
             <a:extLst>
               <a:ext uri="{FF2B5EF4-FFF2-40B4-BE49-F238E27FC236}">
-                <a16:creationId xmlns="" xmlns:a16="http://schemas.microsoft.com/office/drawing/2014/main" id="{4BF5E58B-CA7A-9F4F-ACEC-E6358EEF62E7}"/>
+                <a16:creationId xmlns:a16="http://schemas.microsoft.com/office/drawing/2014/main" xmlns="" id="{4BF5E58B-CA7A-9F4F-ACEC-E6358EEF62E7}"/>
               </a:ext>
             </a:extLst>
           </p:cNvPr>
@@ -5173,7 +5173,7 @@
           <p:cNvPr id="9" name="Slide Number Placeholder 8">
             <a:extLst>
               <a:ext uri="{FF2B5EF4-FFF2-40B4-BE49-F238E27FC236}">
-                <a16:creationId xmlns="" xmlns:a16="http://schemas.microsoft.com/office/drawing/2014/main" id="{BE6B23CD-A1EF-5A42-B208-868C8885248C}"/>
+                <a16:creationId xmlns:a16="http://schemas.microsoft.com/office/drawing/2014/main" xmlns="" id="{BE6B23CD-A1EF-5A42-B208-868C8885248C}"/>
               </a:ext>
             </a:extLst>
           </p:cNvPr>
@@ -5232,7 +5232,7 @@
           <p:cNvPr id="2" name="Title 1">
             <a:extLst>
               <a:ext uri="{FF2B5EF4-FFF2-40B4-BE49-F238E27FC236}">
-                <a16:creationId xmlns="" xmlns:a16="http://schemas.microsoft.com/office/drawing/2014/main" id="{703F6DB2-C8F8-2B4C-A828-A4BD27053A89}"/>
+                <a16:creationId xmlns:a16="http://schemas.microsoft.com/office/drawing/2014/main" xmlns="" id="{703F6DB2-C8F8-2B4C-A828-A4BD27053A89}"/>
               </a:ext>
             </a:extLst>
           </p:cNvPr>
@@ -5260,7 +5260,7 @@
           <p:cNvPr id="3" name="Date Placeholder 2">
             <a:extLst>
               <a:ext uri="{FF2B5EF4-FFF2-40B4-BE49-F238E27FC236}">
-                <a16:creationId xmlns="" xmlns:a16="http://schemas.microsoft.com/office/drawing/2014/main" id="{F0FFA1AA-94FA-4347-A797-03D12F38E0F2}"/>
+                <a16:creationId xmlns:a16="http://schemas.microsoft.com/office/drawing/2014/main" xmlns="" id="{F0FFA1AA-94FA-4347-A797-03D12F38E0F2}"/>
               </a:ext>
             </a:extLst>
           </p:cNvPr>
@@ -5278,7 +5278,7 @@
           <a:p>
             <a:fld id="{2AD54A35-3D00-9346-A90C-D5D0667B371F}" type="datetimeFigureOut">
               <a:rPr lang="en-US" smtClean="0"/>
-              <a:t>10/11/20</a:t>
+              <a:t>11/16/20</a:t>
             </a:fld>
             <a:endParaRPr lang="en-US"/>
           </a:p>
@@ -5289,7 +5289,7 @@
           <p:cNvPr id="4" name="Footer Placeholder 3">
             <a:extLst>
               <a:ext uri="{FF2B5EF4-FFF2-40B4-BE49-F238E27FC236}">
-                <a16:creationId xmlns="" xmlns:a16="http://schemas.microsoft.com/office/drawing/2014/main" id="{CAF3498B-C124-3E48-98F2-B51D5ED7DCC5}"/>
+                <a16:creationId xmlns:a16="http://schemas.microsoft.com/office/drawing/2014/main" xmlns="" id="{CAF3498B-C124-3E48-98F2-B51D5ED7DCC5}"/>
               </a:ext>
             </a:extLst>
           </p:cNvPr>
@@ -5314,7 +5314,7 @@
           <p:cNvPr id="5" name="Slide Number Placeholder 4">
             <a:extLst>
               <a:ext uri="{FF2B5EF4-FFF2-40B4-BE49-F238E27FC236}">
-                <a16:creationId xmlns="" xmlns:a16="http://schemas.microsoft.com/office/drawing/2014/main" id="{8E35682A-FA69-6841-8535-6C9A8B33EAF4}"/>
+                <a16:creationId xmlns:a16="http://schemas.microsoft.com/office/drawing/2014/main" xmlns="" id="{8E35682A-FA69-6841-8535-6C9A8B33EAF4}"/>
               </a:ext>
             </a:extLst>
           </p:cNvPr>
@@ -5373,7 +5373,7 @@
           <p:cNvPr id="2" name="Date Placeholder 1">
             <a:extLst>
               <a:ext uri="{FF2B5EF4-FFF2-40B4-BE49-F238E27FC236}">
-                <a16:creationId xmlns="" xmlns:a16="http://schemas.microsoft.com/office/drawing/2014/main" id="{931B743E-6ED9-E148-A50A-4027C437B6B2}"/>
+                <a16:creationId xmlns:a16="http://schemas.microsoft.com/office/drawing/2014/main" xmlns="" id="{931B743E-6ED9-E148-A50A-4027C437B6B2}"/>
               </a:ext>
             </a:extLst>
           </p:cNvPr>
@@ -5391,7 +5391,7 @@
           <a:p>
             <a:fld id="{2AD54A35-3D00-9346-A90C-D5D0667B371F}" type="datetimeFigureOut">
               <a:rPr lang="en-US" smtClean="0"/>
-              <a:t>10/11/20</a:t>
+              <a:t>11/16/20</a:t>
             </a:fld>
             <a:endParaRPr lang="en-US"/>
           </a:p>
@@ -5402,7 +5402,7 @@
           <p:cNvPr id="3" name="Footer Placeholder 2">
             <a:extLst>
               <a:ext uri="{FF2B5EF4-FFF2-40B4-BE49-F238E27FC236}">
-                <a16:creationId xmlns="" xmlns:a16="http://schemas.microsoft.com/office/drawing/2014/main" id="{2EA84763-B782-994F-A6AE-AB888231FDB1}"/>
+                <a16:creationId xmlns:a16="http://schemas.microsoft.com/office/drawing/2014/main" xmlns="" id="{2EA84763-B782-994F-A6AE-AB888231FDB1}"/>
               </a:ext>
             </a:extLst>
           </p:cNvPr>
@@ -5427,7 +5427,7 @@
           <p:cNvPr id="4" name="Slide Number Placeholder 3">
             <a:extLst>
               <a:ext uri="{FF2B5EF4-FFF2-40B4-BE49-F238E27FC236}">
-                <a16:creationId xmlns="" xmlns:a16="http://schemas.microsoft.com/office/drawing/2014/main" id="{BEBBE305-122C-FB4F-9867-3C060640909F}"/>
+                <a16:creationId xmlns:a16="http://schemas.microsoft.com/office/drawing/2014/main" xmlns="" id="{BEBBE305-122C-FB4F-9867-3C060640909F}"/>
               </a:ext>
             </a:extLst>
           </p:cNvPr>
@@ -5486,7 +5486,7 @@
           <p:cNvPr id="2" name="Title 1">
             <a:extLst>
               <a:ext uri="{FF2B5EF4-FFF2-40B4-BE49-F238E27FC236}">
-                <a16:creationId xmlns="" xmlns:a16="http://schemas.microsoft.com/office/drawing/2014/main" id="{B6EF527D-308B-6B43-A7F4-41D7724527E8}"/>
+                <a16:creationId xmlns:a16="http://schemas.microsoft.com/office/drawing/2014/main" xmlns="" id="{B6EF527D-308B-6B43-A7F4-41D7724527E8}"/>
               </a:ext>
             </a:extLst>
           </p:cNvPr>
@@ -5523,7 +5523,7 @@
           <p:cNvPr id="3" name="Content Placeholder 2">
             <a:extLst>
               <a:ext uri="{FF2B5EF4-FFF2-40B4-BE49-F238E27FC236}">
-                <a16:creationId xmlns="" xmlns:a16="http://schemas.microsoft.com/office/drawing/2014/main" id="{2AB6D04B-009F-5F45-8F98-2B285CC51C3C}"/>
+                <a16:creationId xmlns:a16="http://schemas.microsoft.com/office/drawing/2014/main" xmlns="" id="{2AB6D04B-009F-5F45-8F98-2B285CC51C3C}"/>
               </a:ext>
             </a:extLst>
           </p:cNvPr>
@@ -5613,7 +5613,7 @@
           <p:cNvPr id="4" name="Text Placeholder 3">
             <a:extLst>
               <a:ext uri="{FF2B5EF4-FFF2-40B4-BE49-F238E27FC236}">
-                <a16:creationId xmlns="" xmlns:a16="http://schemas.microsoft.com/office/drawing/2014/main" id="{501FC7AE-E107-5843-BD44-CA2602BF00E7}"/>
+                <a16:creationId xmlns:a16="http://schemas.microsoft.com/office/drawing/2014/main" xmlns="" id="{501FC7AE-E107-5843-BD44-CA2602BF00E7}"/>
               </a:ext>
             </a:extLst>
           </p:cNvPr>
@@ -5684,7 +5684,7 @@
           <p:cNvPr id="5" name="Date Placeholder 4">
             <a:extLst>
               <a:ext uri="{FF2B5EF4-FFF2-40B4-BE49-F238E27FC236}">
-                <a16:creationId xmlns="" xmlns:a16="http://schemas.microsoft.com/office/drawing/2014/main" id="{1DC3D721-7195-024D-9BB4-2ECA2A488268}"/>
+                <a16:creationId xmlns:a16="http://schemas.microsoft.com/office/drawing/2014/main" xmlns="" id="{1DC3D721-7195-024D-9BB4-2ECA2A488268}"/>
               </a:ext>
             </a:extLst>
           </p:cNvPr>
@@ -5702,7 +5702,7 @@
           <a:p>
             <a:fld id="{2AD54A35-3D00-9346-A90C-D5D0667B371F}" type="datetimeFigureOut">
               <a:rPr lang="en-US" smtClean="0"/>
-              <a:t>10/11/20</a:t>
+              <a:t>11/16/20</a:t>
             </a:fld>
             <a:endParaRPr lang="en-US"/>
           </a:p>
@@ -5713,7 +5713,7 @@
           <p:cNvPr id="6" name="Footer Placeholder 5">
             <a:extLst>
               <a:ext uri="{FF2B5EF4-FFF2-40B4-BE49-F238E27FC236}">
-                <a16:creationId xmlns="" xmlns:a16="http://schemas.microsoft.com/office/drawing/2014/main" id="{03A3E2D8-698C-AB43-9C55-7C9293F9F978}"/>
+                <a16:creationId xmlns:a16="http://schemas.microsoft.com/office/drawing/2014/main" xmlns="" id="{03A3E2D8-698C-AB43-9C55-7C9293F9F978}"/>
               </a:ext>
             </a:extLst>
           </p:cNvPr>
@@ -5738,7 +5738,7 @@
           <p:cNvPr id="7" name="Slide Number Placeholder 6">
             <a:extLst>
               <a:ext uri="{FF2B5EF4-FFF2-40B4-BE49-F238E27FC236}">
-                <a16:creationId xmlns="" xmlns:a16="http://schemas.microsoft.com/office/drawing/2014/main" id="{AC334DCD-F82A-5640-A628-737954C6E93F}"/>
+                <a16:creationId xmlns:a16="http://schemas.microsoft.com/office/drawing/2014/main" xmlns="" id="{AC334DCD-F82A-5640-A628-737954C6E93F}"/>
               </a:ext>
             </a:extLst>
           </p:cNvPr>
@@ -5797,7 +5797,7 @@
           <p:cNvPr id="2" name="Title 1">
             <a:extLst>
               <a:ext uri="{FF2B5EF4-FFF2-40B4-BE49-F238E27FC236}">
-                <a16:creationId xmlns="" xmlns:a16="http://schemas.microsoft.com/office/drawing/2014/main" id="{A8930BAB-3FA9-0D45-8D32-F13C96BE17D1}"/>
+                <a16:creationId xmlns:a16="http://schemas.microsoft.com/office/drawing/2014/main" xmlns="" id="{A8930BAB-3FA9-0D45-8D32-F13C96BE17D1}"/>
               </a:ext>
             </a:extLst>
           </p:cNvPr>
@@ -5834,7 +5834,7 @@
           <p:cNvPr id="3" name="Picture Placeholder 2">
             <a:extLst>
               <a:ext uri="{FF2B5EF4-FFF2-40B4-BE49-F238E27FC236}">
-                <a16:creationId xmlns="" xmlns:a16="http://schemas.microsoft.com/office/drawing/2014/main" id="{7B2582F8-2B8F-6348-822D-D3E251316097}"/>
+                <a16:creationId xmlns:a16="http://schemas.microsoft.com/office/drawing/2014/main" xmlns="" id="{7B2582F8-2B8F-6348-822D-D3E251316097}"/>
               </a:ext>
             </a:extLst>
           </p:cNvPr>
@@ -5901,7 +5901,7 @@
           <p:cNvPr id="4" name="Text Placeholder 3">
             <a:extLst>
               <a:ext uri="{FF2B5EF4-FFF2-40B4-BE49-F238E27FC236}">
-                <a16:creationId xmlns="" xmlns:a16="http://schemas.microsoft.com/office/drawing/2014/main" id="{0EF7D9B5-55BD-904F-AC49-F3885E0BE60A}"/>
+                <a16:creationId xmlns:a16="http://schemas.microsoft.com/office/drawing/2014/main" xmlns="" id="{0EF7D9B5-55BD-904F-AC49-F3885E0BE60A}"/>
               </a:ext>
             </a:extLst>
           </p:cNvPr>
@@ -5972,7 +5972,7 @@
           <p:cNvPr id="5" name="Date Placeholder 4">
             <a:extLst>
               <a:ext uri="{FF2B5EF4-FFF2-40B4-BE49-F238E27FC236}">
-                <a16:creationId xmlns="" xmlns:a16="http://schemas.microsoft.com/office/drawing/2014/main" id="{DE65F069-D268-F045-835A-634C9A4493B6}"/>
+                <a16:creationId xmlns:a16="http://schemas.microsoft.com/office/drawing/2014/main" xmlns="" id="{DE65F069-D268-F045-835A-634C9A4493B6}"/>
               </a:ext>
             </a:extLst>
           </p:cNvPr>
@@ -5990,7 +5990,7 @@
           <a:p>
             <a:fld id="{2AD54A35-3D00-9346-A90C-D5D0667B371F}" type="datetimeFigureOut">
               <a:rPr lang="en-US" smtClean="0"/>
-              <a:t>10/11/20</a:t>
+              <a:t>11/16/20</a:t>
             </a:fld>
             <a:endParaRPr lang="en-US"/>
           </a:p>
@@ -6001,7 +6001,7 @@
           <p:cNvPr id="6" name="Footer Placeholder 5">
             <a:extLst>
               <a:ext uri="{FF2B5EF4-FFF2-40B4-BE49-F238E27FC236}">
-                <a16:creationId xmlns="" xmlns:a16="http://schemas.microsoft.com/office/drawing/2014/main" id="{E52DE5EE-4E26-394A-9C40-BDB87F678B74}"/>
+                <a16:creationId xmlns:a16="http://schemas.microsoft.com/office/drawing/2014/main" xmlns="" id="{E52DE5EE-4E26-394A-9C40-BDB87F678B74}"/>
               </a:ext>
             </a:extLst>
           </p:cNvPr>
@@ -6026,7 +6026,7 @@
           <p:cNvPr id="7" name="Slide Number Placeholder 6">
             <a:extLst>
               <a:ext uri="{FF2B5EF4-FFF2-40B4-BE49-F238E27FC236}">
-                <a16:creationId xmlns="" xmlns:a16="http://schemas.microsoft.com/office/drawing/2014/main" id="{5B801774-5FD1-A54F-ABD3-160F69F1E530}"/>
+                <a16:creationId xmlns:a16="http://schemas.microsoft.com/office/drawing/2014/main" xmlns="" id="{5B801774-5FD1-A54F-ABD3-160F69F1E530}"/>
               </a:ext>
             </a:extLst>
           </p:cNvPr>
@@ -6090,7 +6090,7 @@
           <p:cNvPr id="2" name="Title Placeholder 1">
             <a:extLst>
               <a:ext uri="{FF2B5EF4-FFF2-40B4-BE49-F238E27FC236}">
-                <a16:creationId xmlns="" xmlns:a16="http://schemas.microsoft.com/office/drawing/2014/main" id="{143A8776-B071-7F4C-80CB-8A4F87A49404}"/>
+                <a16:creationId xmlns:a16="http://schemas.microsoft.com/office/drawing/2014/main" xmlns="" id="{143A8776-B071-7F4C-80CB-8A4F87A49404}"/>
               </a:ext>
             </a:extLst>
           </p:cNvPr>
@@ -6128,7 +6128,7 @@
           <p:cNvPr id="3" name="Text Placeholder 2">
             <a:extLst>
               <a:ext uri="{FF2B5EF4-FFF2-40B4-BE49-F238E27FC236}">
-                <a16:creationId xmlns="" xmlns:a16="http://schemas.microsoft.com/office/drawing/2014/main" id="{576995E7-0CA4-244E-813F-ADBFA2B982BC}"/>
+                <a16:creationId xmlns:a16="http://schemas.microsoft.com/office/drawing/2014/main" xmlns="" id="{576995E7-0CA4-244E-813F-ADBFA2B982BC}"/>
               </a:ext>
             </a:extLst>
           </p:cNvPr>
@@ -6195,7 +6195,7 @@
           <p:cNvPr id="4" name="Date Placeholder 3">
             <a:extLst>
               <a:ext uri="{FF2B5EF4-FFF2-40B4-BE49-F238E27FC236}">
-                <a16:creationId xmlns="" xmlns:a16="http://schemas.microsoft.com/office/drawing/2014/main" id="{2FA1158F-6BA5-1843-89D0-B1D7E4B651D8}"/>
+                <a16:creationId xmlns:a16="http://schemas.microsoft.com/office/drawing/2014/main" xmlns="" id="{2FA1158F-6BA5-1843-89D0-B1D7E4B651D8}"/>
               </a:ext>
             </a:extLst>
           </p:cNvPr>
@@ -6231,7 +6231,7 @@
           <a:p>
             <a:fld id="{2AD54A35-3D00-9346-A90C-D5D0667B371F}" type="datetimeFigureOut">
               <a:rPr lang="en-US" smtClean="0"/>
-              <a:t>10/11/20</a:t>
+              <a:t>11/16/20</a:t>
             </a:fld>
             <a:endParaRPr lang="en-US"/>
           </a:p>
@@ -6242,7 +6242,7 @@
           <p:cNvPr id="5" name="Footer Placeholder 4">
             <a:extLst>
               <a:ext uri="{FF2B5EF4-FFF2-40B4-BE49-F238E27FC236}">
-                <a16:creationId xmlns="" xmlns:a16="http://schemas.microsoft.com/office/drawing/2014/main" id="{2635DD9C-A3B9-F749-977D-B98ED384D58A}"/>
+                <a16:creationId xmlns:a16="http://schemas.microsoft.com/office/drawing/2014/main" xmlns="" id="{2635DD9C-A3B9-F749-977D-B98ED384D58A}"/>
               </a:ext>
             </a:extLst>
           </p:cNvPr>
@@ -6285,7 +6285,7 @@
           <p:cNvPr id="6" name="Slide Number Placeholder 5">
             <a:extLst>
               <a:ext uri="{FF2B5EF4-FFF2-40B4-BE49-F238E27FC236}">
-                <a16:creationId xmlns="" xmlns:a16="http://schemas.microsoft.com/office/drawing/2014/main" id="{296A0EB5-132D-F04D-8265-B55F7C455D20}"/>
+                <a16:creationId xmlns:a16="http://schemas.microsoft.com/office/drawing/2014/main" xmlns="" id="{296A0EB5-132D-F04D-8265-B55F7C455D20}"/>
               </a:ext>
             </a:extLst>
           </p:cNvPr>
@@ -6791,7 +6791,7 @@
                 <a:sym typeface="Arial"/>
               </a:rPr>
               <a:pPr/>
-              <a:t>10/11/20</a:t>
+              <a:t>11/16/20</a:t>
             </a:fld>
             <a:endParaRPr lang="en-US">
               <a:solidFill>
@@ -7421,7 +7421,7 @@
           <p:cNvPr id="2" name="Title 1">
             <a:extLst>
               <a:ext uri="{FF2B5EF4-FFF2-40B4-BE49-F238E27FC236}">
-                <a16:creationId xmlns="" xmlns:a16="http://schemas.microsoft.com/office/drawing/2014/main" id="{358DD9C9-8F33-7E4A-BB20-4A3F6AD77B5D}"/>
+                <a16:creationId xmlns:a16="http://schemas.microsoft.com/office/drawing/2014/main" xmlns="" id="{358DD9C9-8F33-7E4A-BB20-4A3F6AD77B5D}"/>
               </a:ext>
             </a:extLst>
           </p:cNvPr>
@@ -7449,7 +7449,7 @@
           <p:cNvPr id="9" name="Content Placeholder 8">
             <a:extLst>
               <a:ext uri="{FF2B5EF4-FFF2-40B4-BE49-F238E27FC236}">
-                <a16:creationId xmlns="" xmlns:a16="http://schemas.microsoft.com/office/drawing/2014/main" id="{F810C112-AE3F-A641-BC01-FA48DBAF9144}"/>
+                <a16:creationId xmlns:a16="http://schemas.microsoft.com/office/drawing/2014/main" xmlns="" id="{F810C112-AE3F-A641-BC01-FA48DBAF9144}"/>
               </a:ext>
             </a:extLst>
           </p:cNvPr>
@@ -7609,7 +7609,7 @@
           <p:cNvPr id="2" name="Title 1">
             <a:extLst>
               <a:ext uri="{FF2B5EF4-FFF2-40B4-BE49-F238E27FC236}">
-                <a16:creationId xmlns="" xmlns:a16="http://schemas.microsoft.com/office/drawing/2014/main" id="{9FB9BB7C-52A8-154E-8E15-F777238E86FE}"/>
+                <a16:creationId xmlns:a16="http://schemas.microsoft.com/office/drawing/2014/main" xmlns="" id="{9FB9BB7C-52A8-154E-8E15-F777238E86FE}"/>
               </a:ext>
             </a:extLst>
           </p:cNvPr>
@@ -7637,7 +7637,7 @@
           <p:cNvPr id="3" name="Content Placeholder 2">
             <a:extLst>
               <a:ext uri="{FF2B5EF4-FFF2-40B4-BE49-F238E27FC236}">
-                <a16:creationId xmlns="" xmlns:a16="http://schemas.microsoft.com/office/drawing/2014/main" id="{BDC8DC68-BF5E-6A4F-A33F-EFD052CFD7DA}"/>
+                <a16:creationId xmlns:a16="http://schemas.microsoft.com/office/drawing/2014/main" xmlns="" id="{BDC8DC68-BF5E-6A4F-A33F-EFD052CFD7DA}"/>
               </a:ext>
             </a:extLst>
           </p:cNvPr>
@@ -7743,7 +7743,7 @@
           <p:cNvPr id="2" name="Title 1">
             <a:extLst>
               <a:ext uri="{FF2B5EF4-FFF2-40B4-BE49-F238E27FC236}">
-                <a16:creationId xmlns="" xmlns:a16="http://schemas.microsoft.com/office/drawing/2014/main" id="{70498598-EC03-7B4A-93A2-F271F535EB18}"/>
+                <a16:creationId xmlns:a16="http://schemas.microsoft.com/office/drawing/2014/main" xmlns="" id="{70498598-EC03-7B4A-93A2-F271F535EB18}"/>
               </a:ext>
             </a:extLst>
           </p:cNvPr>
@@ -7771,7 +7771,7 @@
           <p:cNvPr id="3" name="Content Placeholder 2">
             <a:extLst>
               <a:ext uri="{FF2B5EF4-FFF2-40B4-BE49-F238E27FC236}">
-                <a16:creationId xmlns="" xmlns:a16="http://schemas.microsoft.com/office/drawing/2014/main" id="{8B9C86E3-CE2D-0345-BE91-0265ECE10E7D}"/>
+                <a16:creationId xmlns:a16="http://schemas.microsoft.com/office/drawing/2014/main" xmlns="" id="{8B9C86E3-CE2D-0345-BE91-0265ECE10E7D}"/>
               </a:ext>
             </a:extLst>
           </p:cNvPr>
@@ -7883,7 +7883,7 @@
           <p:cNvPr id="2" name="Title 1">
             <a:extLst>
               <a:ext uri="{FF2B5EF4-FFF2-40B4-BE49-F238E27FC236}">
-                <a16:creationId xmlns="" xmlns:a16="http://schemas.microsoft.com/office/drawing/2014/main" id="{358DD9C9-8F33-7E4A-BB20-4A3F6AD77B5D}"/>
+                <a16:creationId xmlns:a16="http://schemas.microsoft.com/office/drawing/2014/main" xmlns="" id="{358DD9C9-8F33-7E4A-BB20-4A3F6AD77B5D}"/>
               </a:ext>
             </a:extLst>
           </p:cNvPr>
@@ -7911,7 +7911,7 @@
           <p:cNvPr id="6" name="Text Placeholder 5">
             <a:extLst>
               <a:ext uri="{FF2B5EF4-FFF2-40B4-BE49-F238E27FC236}">
-                <a16:creationId xmlns="" xmlns:a16="http://schemas.microsoft.com/office/drawing/2014/main" id="{33DE313B-952F-1E4C-AE6C-DE987F56F535}"/>
+                <a16:creationId xmlns:a16="http://schemas.microsoft.com/office/drawing/2014/main" xmlns="" id="{33DE313B-952F-1E4C-AE6C-DE987F56F535}"/>
               </a:ext>
             </a:extLst>
           </p:cNvPr>
@@ -7941,7 +7941,7 @@
           <p:cNvPr id="8" name="Text Placeholder 7">
             <a:extLst>
               <a:ext uri="{FF2B5EF4-FFF2-40B4-BE49-F238E27FC236}">
-                <a16:creationId xmlns="" xmlns:a16="http://schemas.microsoft.com/office/drawing/2014/main" id="{C537B1CD-2687-A74D-9CB8-34E12374C3FC}"/>
+                <a16:creationId xmlns:a16="http://schemas.microsoft.com/office/drawing/2014/main" xmlns="" id="{C537B1CD-2687-A74D-9CB8-34E12374C3FC}"/>
               </a:ext>
             </a:extLst>
           </p:cNvPr>
@@ -7971,7 +7971,7 @@
           <p:cNvPr id="10" name="Rectangle 9">
             <a:extLst>
               <a:ext uri="{FF2B5EF4-FFF2-40B4-BE49-F238E27FC236}">
-                <a16:creationId xmlns="" xmlns:a16="http://schemas.microsoft.com/office/drawing/2014/main" id="{D3256648-E5B4-7A4E-80CC-2D668B6CD5D2}"/>
+                <a16:creationId xmlns:a16="http://schemas.microsoft.com/office/drawing/2014/main" xmlns="" id="{D3256648-E5B4-7A4E-80CC-2D668B6CD5D2}"/>
               </a:ext>
             </a:extLst>
           </p:cNvPr>
@@ -8020,7 +8020,7 @@
           <p:cNvPr id="11" name="Rectangle 10">
             <a:extLst>
               <a:ext uri="{FF2B5EF4-FFF2-40B4-BE49-F238E27FC236}">
-                <a16:creationId xmlns="" xmlns:a16="http://schemas.microsoft.com/office/drawing/2014/main" id="{3815DE27-3230-0745-A0A7-FD0479EE2681}"/>
+                <a16:creationId xmlns:a16="http://schemas.microsoft.com/office/drawing/2014/main" xmlns="" id="{3815DE27-3230-0745-A0A7-FD0479EE2681}"/>
               </a:ext>
             </a:extLst>
           </p:cNvPr>
@@ -8069,7 +8069,7 @@
           <p:cNvPr id="13" name="TextBox 12">
             <a:extLst>
               <a:ext uri="{FF2B5EF4-FFF2-40B4-BE49-F238E27FC236}">
-                <a16:creationId xmlns="" xmlns:a16="http://schemas.microsoft.com/office/drawing/2014/main" id="{42FD6980-3EDE-2847-8349-F1AA40313C00}"/>
+                <a16:creationId xmlns:a16="http://schemas.microsoft.com/office/drawing/2014/main" xmlns="" id="{42FD6980-3EDE-2847-8349-F1AA40313C00}"/>
               </a:ext>
             </a:extLst>
           </p:cNvPr>
@@ -8105,7 +8105,7 @@
           <p:cNvPr id="15" name="Straight Connector 14">
             <a:extLst>
               <a:ext uri="{FF2B5EF4-FFF2-40B4-BE49-F238E27FC236}">
-                <a16:creationId xmlns="" xmlns:a16="http://schemas.microsoft.com/office/drawing/2014/main" id="{F1D691CA-1D10-634D-BF35-A6485C7982FF}"/>
+                <a16:creationId xmlns:a16="http://schemas.microsoft.com/office/drawing/2014/main" xmlns="" id="{F1D691CA-1D10-634D-BF35-A6485C7982FF}"/>
               </a:ext>
             </a:extLst>
           </p:cNvPr>
@@ -8149,7 +8149,7 @@
           <p:cNvPr id="16" name="Rectangle 15">
             <a:extLst>
               <a:ext uri="{FF2B5EF4-FFF2-40B4-BE49-F238E27FC236}">
-                <a16:creationId xmlns="" xmlns:a16="http://schemas.microsoft.com/office/drawing/2014/main" id="{77CD1CDC-491B-0D4C-AAFB-2E8EA3282914}"/>
+                <a16:creationId xmlns:a16="http://schemas.microsoft.com/office/drawing/2014/main" xmlns="" id="{77CD1CDC-491B-0D4C-AAFB-2E8EA3282914}"/>
               </a:ext>
             </a:extLst>
           </p:cNvPr>
@@ -8198,7 +8198,7 @@
           <p:cNvPr id="17" name="Rectangle 16">
             <a:extLst>
               <a:ext uri="{FF2B5EF4-FFF2-40B4-BE49-F238E27FC236}">
-                <a16:creationId xmlns="" xmlns:a16="http://schemas.microsoft.com/office/drawing/2014/main" id="{234663B7-ACA3-DD4B-8C70-90B4123D86D5}"/>
+                <a16:creationId xmlns:a16="http://schemas.microsoft.com/office/drawing/2014/main" xmlns="" id="{234663B7-ACA3-DD4B-8C70-90B4123D86D5}"/>
               </a:ext>
             </a:extLst>
           </p:cNvPr>
@@ -8247,7 +8247,7 @@
           <p:cNvPr id="23" name="Curved Connector 22">
             <a:extLst>
               <a:ext uri="{FF2B5EF4-FFF2-40B4-BE49-F238E27FC236}">
-                <a16:creationId xmlns="" xmlns:a16="http://schemas.microsoft.com/office/drawing/2014/main" id="{B12187BD-7BCE-E54A-AE76-8C910DB1A41D}"/>
+                <a16:creationId xmlns:a16="http://schemas.microsoft.com/office/drawing/2014/main" xmlns="" id="{B12187BD-7BCE-E54A-AE76-8C910DB1A41D}"/>
               </a:ext>
             </a:extLst>
           </p:cNvPr>
@@ -8292,7 +8292,7 @@
           <p:cNvPr id="25" name="Rectangle 24">
             <a:extLst>
               <a:ext uri="{FF2B5EF4-FFF2-40B4-BE49-F238E27FC236}">
-                <a16:creationId xmlns="" xmlns:a16="http://schemas.microsoft.com/office/drawing/2014/main" id="{04A1F68B-8FD7-2A40-9A6F-5EC96778ABA3}"/>
+                <a16:creationId xmlns:a16="http://schemas.microsoft.com/office/drawing/2014/main" xmlns="" id="{04A1F68B-8FD7-2A40-9A6F-5EC96778ABA3}"/>
               </a:ext>
             </a:extLst>
           </p:cNvPr>
@@ -8341,7 +8341,7 @@
           <p:cNvPr id="27" name="Rectangle 26">
             <a:extLst>
               <a:ext uri="{FF2B5EF4-FFF2-40B4-BE49-F238E27FC236}">
-                <a16:creationId xmlns="" xmlns:a16="http://schemas.microsoft.com/office/drawing/2014/main" id="{1320079D-53A3-B14C-A832-AD503BF156C5}"/>
+                <a16:creationId xmlns:a16="http://schemas.microsoft.com/office/drawing/2014/main" xmlns="" id="{1320079D-53A3-B14C-A832-AD503BF156C5}"/>
               </a:ext>
             </a:extLst>
           </p:cNvPr>
@@ -8390,7 +8390,7 @@
           <p:cNvPr id="28" name="Curved Connector 27">
             <a:extLst>
               <a:ext uri="{FF2B5EF4-FFF2-40B4-BE49-F238E27FC236}">
-                <a16:creationId xmlns="" xmlns:a16="http://schemas.microsoft.com/office/drawing/2014/main" id="{5B628F0E-A965-964F-B388-0AA841F54F35}"/>
+                <a16:creationId xmlns:a16="http://schemas.microsoft.com/office/drawing/2014/main" xmlns="" id="{5B628F0E-A965-964F-B388-0AA841F54F35}"/>
               </a:ext>
             </a:extLst>
           </p:cNvPr>
@@ -8436,7 +8436,7 @@
           <p:cNvPr id="31" name="Curved Connector 30">
             <a:extLst>
               <a:ext uri="{FF2B5EF4-FFF2-40B4-BE49-F238E27FC236}">
-                <a16:creationId xmlns="" xmlns:a16="http://schemas.microsoft.com/office/drawing/2014/main" id="{D6223184-A810-8C4E-8DD6-BDE3F8857DAF}"/>
+                <a16:creationId xmlns:a16="http://schemas.microsoft.com/office/drawing/2014/main" xmlns="" id="{D6223184-A810-8C4E-8DD6-BDE3F8857DAF}"/>
               </a:ext>
             </a:extLst>
           </p:cNvPr>
@@ -8482,7 +8482,7 @@
           <p:cNvPr id="34" name="Curved Connector 33">
             <a:extLst>
               <a:ext uri="{FF2B5EF4-FFF2-40B4-BE49-F238E27FC236}">
-                <a16:creationId xmlns="" xmlns:a16="http://schemas.microsoft.com/office/drawing/2014/main" id="{5FAAE7BA-4D42-A645-BEF3-2E796B982B4F}"/>
+                <a16:creationId xmlns:a16="http://schemas.microsoft.com/office/drawing/2014/main" xmlns="" id="{5FAAE7BA-4D42-A645-BEF3-2E796B982B4F}"/>
               </a:ext>
             </a:extLst>
           </p:cNvPr>
@@ -8528,7 +8528,7 @@
           <p:cNvPr id="3" name="TextBox 2">
             <a:extLst>
               <a:ext uri="{FF2B5EF4-FFF2-40B4-BE49-F238E27FC236}">
-                <a16:creationId xmlns="" xmlns:a16="http://schemas.microsoft.com/office/drawing/2014/main" id="{50CDAB78-B049-7743-B9D3-9C36809A8836}"/>
+                <a16:creationId xmlns:a16="http://schemas.microsoft.com/office/drawing/2014/main" xmlns="" id="{50CDAB78-B049-7743-B9D3-9C36809A8836}"/>
               </a:ext>
             </a:extLst>
           </p:cNvPr>
@@ -8563,7 +8563,7 @@
           <p:cNvPr id="4" name="TextBox 3">
             <a:extLst>
               <a:ext uri="{FF2B5EF4-FFF2-40B4-BE49-F238E27FC236}">
-                <a16:creationId xmlns="" xmlns:a16="http://schemas.microsoft.com/office/drawing/2014/main" id="{F78FF2AD-57E1-E248-A20B-3BE3D5EC5860}"/>
+                <a16:creationId xmlns:a16="http://schemas.microsoft.com/office/drawing/2014/main" xmlns="" id="{F78FF2AD-57E1-E248-A20B-3BE3D5EC5860}"/>
               </a:ext>
             </a:extLst>
           </p:cNvPr>
@@ -8602,7 +8602,7 @@
           <p:cNvPr id="19" name="TextBox 18">
             <a:extLst>
               <a:ext uri="{FF2B5EF4-FFF2-40B4-BE49-F238E27FC236}">
-                <a16:creationId xmlns="" xmlns:a16="http://schemas.microsoft.com/office/drawing/2014/main" id="{4209A6ED-466C-9647-B3A0-E8BD8D217464}"/>
+                <a16:creationId xmlns:a16="http://schemas.microsoft.com/office/drawing/2014/main" xmlns="" id="{4209A6ED-466C-9647-B3A0-E8BD8D217464}"/>
               </a:ext>
             </a:extLst>
           </p:cNvPr>
@@ -8641,7 +8641,7 @@
           <p:cNvPr id="20" name="TextBox 19">
             <a:extLst>
               <a:ext uri="{FF2B5EF4-FFF2-40B4-BE49-F238E27FC236}">
-                <a16:creationId xmlns="" xmlns:a16="http://schemas.microsoft.com/office/drawing/2014/main" id="{EC1CD3D3-FF03-CA40-9B5A-80F34E8C2740}"/>
+                <a16:creationId xmlns:a16="http://schemas.microsoft.com/office/drawing/2014/main" xmlns="" id="{EC1CD3D3-FF03-CA40-9B5A-80F34E8C2740}"/>
               </a:ext>
             </a:extLst>
           </p:cNvPr>
@@ -8680,7 +8680,7 @@
           <p:cNvPr id="21" name="TextBox 20">
             <a:extLst>
               <a:ext uri="{FF2B5EF4-FFF2-40B4-BE49-F238E27FC236}">
-                <a16:creationId xmlns="" xmlns:a16="http://schemas.microsoft.com/office/drawing/2014/main" id="{B4875DD3-C45D-DD40-AB89-C85DB852A973}"/>
+                <a16:creationId xmlns:a16="http://schemas.microsoft.com/office/drawing/2014/main" xmlns="" id="{B4875DD3-C45D-DD40-AB89-C85DB852A973}"/>
               </a:ext>
             </a:extLst>
           </p:cNvPr>
@@ -8745,7 +8745,7 @@
           <p:cNvPr id="7" name="Title 6">
             <a:extLst>
               <a:ext uri="{FF2B5EF4-FFF2-40B4-BE49-F238E27FC236}">
-                <a16:creationId xmlns="" xmlns:a16="http://schemas.microsoft.com/office/drawing/2014/main" id="{95650F7F-5448-8A4F-8104-405858E21911}"/>
+                <a16:creationId xmlns:a16="http://schemas.microsoft.com/office/drawing/2014/main" xmlns="" id="{95650F7F-5448-8A4F-8104-405858E21911}"/>
               </a:ext>
             </a:extLst>
           </p:cNvPr>
@@ -8773,7 +8773,7 @@
           <p:cNvPr id="8" name="Content Placeholder 7">
             <a:extLst>
               <a:ext uri="{FF2B5EF4-FFF2-40B4-BE49-F238E27FC236}">
-                <a16:creationId xmlns="" xmlns:a16="http://schemas.microsoft.com/office/drawing/2014/main" id="{569A5E1A-575E-2548-9721-209A3CC3DF8F}"/>
+                <a16:creationId xmlns:a16="http://schemas.microsoft.com/office/drawing/2014/main" xmlns="" id="{569A5E1A-575E-2548-9721-209A3CC3DF8F}"/>
               </a:ext>
             </a:extLst>
           </p:cNvPr>
@@ -8893,7 +8893,7 @@
           <p:cNvPr id="7" name="Title 6">
             <a:extLst>
               <a:ext uri="{FF2B5EF4-FFF2-40B4-BE49-F238E27FC236}">
-                <a16:creationId xmlns="" xmlns:a16="http://schemas.microsoft.com/office/drawing/2014/main" id="{068D89FB-C1E1-8346-AFE8-EE02F30080B9}"/>
+                <a16:creationId xmlns:a16="http://schemas.microsoft.com/office/drawing/2014/main" xmlns="" id="{068D89FB-C1E1-8346-AFE8-EE02F30080B9}"/>
               </a:ext>
             </a:extLst>
           </p:cNvPr>
@@ -9012,23 +9012,7 @@
                 <a:ea typeface="Times New Roman" charset="0"/>
                 <a:cs typeface="Times New Roman" charset="0"/>
               </a:rPr>
-              <a:t>CC </a:t>
-            </a:r>
-            <a:r>
-              <a:rPr lang="en-US" sz="2800" dirty="0">
-                <a:latin typeface="Times New Roman" charset="0"/>
-                <a:ea typeface="Times New Roman" charset="0"/>
-                <a:cs typeface="Times New Roman" charset="0"/>
-              </a:rPr>
-              <a:t>BY-SA </a:t>
-            </a:r>
-            <a:r>
-              <a:rPr lang="en-US" sz="2800" dirty="0">
-                <a:latin typeface="Times New Roman" charset="0"/>
-                <a:ea typeface="Times New Roman" charset="0"/>
-                <a:cs typeface="Times New Roman" charset="0"/>
-              </a:rPr>
-              <a:t>4.0. To view a copy of this license, visit </a:t>
+              <a:t>CC BY-SA 4.0. To view a copy of this license, visit </a:t>
             </a:r>
             <a:r>
               <a:rPr lang="en-US" sz="2800" dirty="0">
@@ -9037,16 +9021,7 @@
                 <a:cs typeface="Times New Roman" charset="0"/>
                 <a:hlinkClick r:id="rId2"/>
               </a:rPr>
-              <a:t>https://</a:t>
-            </a:r>
-            <a:r>
-              <a:rPr lang="en-US" sz="2800" dirty="0">
-                <a:latin typeface="Times New Roman" charset="0"/>
-                <a:ea typeface="Times New Roman" charset="0"/>
-                <a:cs typeface="Times New Roman" charset="0"/>
-                <a:hlinkClick r:id="rId2"/>
-              </a:rPr>
-              <a:t>creativecommons.org/licenses/by-sa/4.0</a:t>
+              <a:t>https://creativecommons.org/licenses/by-sa/4.0</a:t>
             </a:r>
             <a:r>
               <a:rPr lang="en-US" sz="2800" dirty="0">
@@ -9232,7 +9207,7 @@
           <p:cNvPr id="2" name="Title 1">
             <a:extLst>
               <a:ext uri="{FF2B5EF4-FFF2-40B4-BE49-F238E27FC236}">
-                <a16:creationId xmlns="" xmlns:a16="http://schemas.microsoft.com/office/drawing/2014/main" id="{44E12AD7-056C-AA4A-984B-DB6C718F0965}"/>
+                <a16:creationId xmlns:a16="http://schemas.microsoft.com/office/drawing/2014/main" xmlns="" id="{44E12AD7-056C-AA4A-984B-DB6C718F0965}"/>
               </a:ext>
             </a:extLst>
           </p:cNvPr>
@@ -9264,7 +9239,7 @@
           <p:cNvPr id="3" name="Content Placeholder 2">
             <a:extLst>
               <a:ext uri="{FF2B5EF4-FFF2-40B4-BE49-F238E27FC236}">
-                <a16:creationId xmlns="" xmlns:a16="http://schemas.microsoft.com/office/drawing/2014/main" id="{BF88A09D-158E-AF45-B6BE-3880F37DE481}"/>
+                <a16:creationId xmlns:a16="http://schemas.microsoft.com/office/drawing/2014/main" xmlns="" id="{BF88A09D-158E-AF45-B6BE-3880F37DE481}"/>
               </a:ext>
             </a:extLst>
           </p:cNvPr>
@@ -9356,7 +9331,7 @@
           <p:cNvPr id="2" name="Title 1">
             <a:extLst>
               <a:ext uri="{FF2B5EF4-FFF2-40B4-BE49-F238E27FC236}">
-                <a16:creationId xmlns="" xmlns:a16="http://schemas.microsoft.com/office/drawing/2014/main" id="{962C75CC-0538-584A-B9B6-FC2C94299AB8}"/>
+                <a16:creationId xmlns:a16="http://schemas.microsoft.com/office/drawing/2014/main" xmlns="" id="{962C75CC-0538-584A-B9B6-FC2C94299AB8}"/>
               </a:ext>
             </a:extLst>
           </p:cNvPr>
@@ -9384,7 +9359,7 @@
           <p:cNvPr id="3" name="Content Placeholder 2">
             <a:extLst>
               <a:ext uri="{FF2B5EF4-FFF2-40B4-BE49-F238E27FC236}">
-                <a16:creationId xmlns="" xmlns:a16="http://schemas.microsoft.com/office/drawing/2014/main" id="{8E1A4BFD-002B-D74B-810A-BA162D1BDB4B}"/>
+                <a16:creationId xmlns:a16="http://schemas.microsoft.com/office/drawing/2014/main" xmlns="" id="{8E1A4BFD-002B-D74B-810A-BA162D1BDB4B}"/>
               </a:ext>
             </a:extLst>
           </p:cNvPr>
@@ -9524,7 +9499,7 @@
           <p:cNvPr id="2" name="Title 1">
             <a:extLst>
               <a:ext uri="{FF2B5EF4-FFF2-40B4-BE49-F238E27FC236}">
-                <a16:creationId xmlns="" xmlns:a16="http://schemas.microsoft.com/office/drawing/2014/main" id="{F8213802-4696-B44F-8498-3FE0946D3E54}"/>
+                <a16:creationId xmlns:a16="http://schemas.microsoft.com/office/drawing/2014/main" xmlns="" id="{F8213802-4696-B44F-8498-3FE0946D3E54}"/>
               </a:ext>
             </a:extLst>
           </p:cNvPr>
@@ -9552,7 +9527,7 @@
           <p:cNvPr id="3" name="Content Placeholder 2">
             <a:extLst>
               <a:ext uri="{FF2B5EF4-FFF2-40B4-BE49-F238E27FC236}">
-                <a16:creationId xmlns="" xmlns:a16="http://schemas.microsoft.com/office/drawing/2014/main" id="{7BD563F5-507C-D040-A6CF-FF3AA33D662F}"/>
+                <a16:creationId xmlns:a16="http://schemas.microsoft.com/office/drawing/2014/main" xmlns="" id="{7BD563F5-507C-D040-A6CF-FF3AA33D662F}"/>
               </a:ext>
             </a:extLst>
           </p:cNvPr>
@@ -9640,13 +9615,7 @@
       </p:sp>
       <p:pic>
         <p:nvPicPr>
-          <p:cNvPr id="4" name="image6.png">
-            <a:extLst>
-              <a:ext uri="{FF2B5EF4-FFF2-40B4-BE49-F238E27FC236}">
-                <a16:creationId xmlns="" xmlns:a16="http://schemas.microsoft.com/office/drawing/2014/main" id="{C9528DF7-603E-2043-8523-58D36F94D23C}"/>
-              </a:ext>
-            </a:extLst>
-          </p:cNvPr>
+          <p:cNvPr id="6" name="Picture 5"/>
           <p:cNvPicPr>
             <a:picLocks noChangeAspect="1"/>
           </p:cNvPicPr>
@@ -9654,20 +9623,18 @@
         </p:nvPicPr>
         <p:blipFill>
           <a:blip r:embed="rId2"/>
-          <a:srcRect/>
           <a:stretch>
             <a:fillRect/>
           </a:stretch>
         </p:blipFill>
         <p:spPr>
           <a:xfrm>
-            <a:off x="7049239" y="2805907"/>
-            <a:ext cx="4876061" cy="3080544"/>
+            <a:off x="7954342" y="3163094"/>
+            <a:ext cx="2882900" cy="1676400"/>
           </a:xfrm>
           <a:prstGeom prst="rect">
             <a:avLst/>
           </a:prstGeom>
-          <a:ln/>
         </p:spPr>
       </p:pic>
     </p:spTree>
@@ -9705,7 +9672,7 @@
           <p:cNvPr id="2" name="Title 1">
             <a:extLst>
               <a:ext uri="{FF2B5EF4-FFF2-40B4-BE49-F238E27FC236}">
-                <a16:creationId xmlns="" xmlns:a16="http://schemas.microsoft.com/office/drawing/2014/main" id="{6DC34002-C3AE-7547-8DB2-2F5A47A64000}"/>
+                <a16:creationId xmlns:a16="http://schemas.microsoft.com/office/drawing/2014/main" xmlns="" id="{6DC34002-C3AE-7547-8DB2-2F5A47A64000}"/>
               </a:ext>
             </a:extLst>
           </p:cNvPr>
@@ -9733,7 +9700,7 @@
           <p:cNvPr id="3" name="Content Placeholder 2">
             <a:extLst>
               <a:ext uri="{FF2B5EF4-FFF2-40B4-BE49-F238E27FC236}">
-                <a16:creationId xmlns="" xmlns:a16="http://schemas.microsoft.com/office/drawing/2014/main" id="{59286B71-E1CD-A44C-A792-969F64D06641}"/>
+                <a16:creationId xmlns:a16="http://schemas.microsoft.com/office/drawing/2014/main" xmlns="" id="{59286B71-E1CD-A44C-A792-969F64D06641}"/>
               </a:ext>
             </a:extLst>
           </p:cNvPr>
@@ -9828,13 +9795,7 @@
       </p:sp>
       <p:pic>
         <p:nvPicPr>
-          <p:cNvPr id="4" name="image3.png">
-            <a:extLst>
-              <a:ext uri="{FF2B5EF4-FFF2-40B4-BE49-F238E27FC236}">
-                <a16:creationId xmlns="" xmlns:a16="http://schemas.microsoft.com/office/drawing/2014/main" id="{93D80FF5-04F7-D648-9D6A-453E9D84461C}"/>
-              </a:ext>
-            </a:extLst>
-          </p:cNvPr>
+          <p:cNvPr id="5" name="Picture 4"/>
           <p:cNvPicPr>
             <a:picLocks noChangeAspect="1"/>
           </p:cNvPicPr>
@@ -9842,20 +9803,18 @@
         </p:nvPicPr>
         <p:blipFill>
           <a:blip r:embed="rId2"/>
-          <a:srcRect/>
           <a:stretch>
             <a:fillRect/>
           </a:stretch>
         </p:blipFill>
         <p:spPr>
           <a:xfrm>
-            <a:off x="7058025" y="4287836"/>
-            <a:ext cx="4996466" cy="2024064"/>
+            <a:off x="7881244" y="3597964"/>
+            <a:ext cx="3472555" cy="2713935"/>
           </a:xfrm>
           <a:prstGeom prst="rect">
             <a:avLst/>
           </a:prstGeom>
-          <a:ln/>
         </p:spPr>
       </p:pic>
     </p:spTree>
@@ -9893,7 +9852,7 @@
           <p:cNvPr id="2" name="Title 1">
             <a:extLst>
               <a:ext uri="{FF2B5EF4-FFF2-40B4-BE49-F238E27FC236}">
-                <a16:creationId xmlns="" xmlns:a16="http://schemas.microsoft.com/office/drawing/2014/main" id="{EBEA536E-6151-4048-99B2-0552801BF57F}"/>
+                <a16:creationId xmlns:a16="http://schemas.microsoft.com/office/drawing/2014/main" xmlns="" id="{EBEA536E-6151-4048-99B2-0552801BF57F}"/>
               </a:ext>
             </a:extLst>
           </p:cNvPr>
@@ -9921,7 +9880,7 @@
           <p:cNvPr id="3" name="Content Placeholder 2">
             <a:extLst>
               <a:ext uri="{FF2B5EF4-FFF2-40B4-BE49-F238E27FC236}">
-                <a16:creationId xmlns="" xmlns:a16="http://schemas.microsoft.com/office/drawing/2014/main" id="{32C3B7DD-8B5F-2243-B63C-7C49BBA6BCE0}"/>
+                <a16:creationId xmlns:a16="http://schemas.microsoft.com/office/drawing/2014/main" xmlns="" id="{32C3B7DD-8B5F-2243-B63C-7C49BBA6BCE0}"/>
               </a:ext>
             </a:extLst>
           </p:cNvPr>
@@ -9986,13 +9945,7 @@
       </p:sp>
       <p:pic>
         <p:nvPicPr>
-          <p:cNvPr id="4" name="image8.png">
-            <a:extLst>
-              <a:ext uri="{FF2B5EF4-FFF2-40B4-BE49-F238E27FC236}">
-                <a16:creationId xmlns="" xmlns:a16="http://schemas.microsoft.com/office/drawing/2014/main" id="{EE6D69AB-4CA2-C74C-937E-2102718BA204}"/>
-              </a:ext>
-            </a:extLst>
-          </p:cNvPr>
+          <p:cNvPr id="5" name="Picture 4"/>
           <p:cNvPicPr>
             <a:picLocks noChangeAspect="1"/>
           </p:cNvPicPr>
@@ -10000,20 +9953,18 @@
         </p:nvPicPr>
         <p:blipFill>
           <a:blip r:embed="rId2"/>
-          <a:srcRect/>
           <a:stretch>
             <a:fillRect/>
           </a:stretch>
         </p:blipFill>
         <p:spPr>
           <a:xfrm>
-            <a:off x="6196016" y="4001294"/>
-            <a:ext cx="5865729" cy="2376202"/>
+            <a:off x="7474226" y="4140674"/>
+            <a:ext cx="3486702" cy="2412250"/>
           </a:xfrm>
           <a:prstGeom prst="rect">
             <a:avLst/>
           </a:prstGeom>
-          <a:ln/>
         </p:spPr>
       </p:pic>
     </p:spTree>
@@ -10051,7 +10002,7 @@
           <p:cNvPr id="2" name="Title 1">
             <a:extLst>
               <a:ext uri="{FF2B5EF4-FFF2-40B4-BE49-F238E27FC236}">
-                <a16:creationId xmlns="" xmlns:a16="http://schemas.microsoft.com/office/drawing/2014/main" id="{688C7C28-906C-F749-855B-A63BBF524998}"/>
+                <a16:creationId xmlns:a16="http://schemas.microsoft.com/office/drawing/2014/main" xmlns="" id="{688C7C28-906C-F749-855B-A63BBF524998}"/>
               </a:ext>
             </a:extLst>
           </p:cNvPr>
@@ -10079,7 +10030,7 @@
           <p:cNvPr id="3" name="Content Placeholder 2">
             <a:extLst>
               <a:ext uri="{FF2B5EF4-FFF2-40B4-BE49-F238E27FC236}">
-                <a16:creationId xmlns="" xmlns:a16="http://schemas.microsoft.com/office/drawing/2014/main" id="{99CB3F95-E860-BF4C-86E7-3D4461EAC52F}"/>
+                <a16:creationId xmlns:a16="http://schemas.microsoft.com/office/drawing/2014/main" xmlns="" id="{99CB3F95-E860-BF4C-86E7-3D4461EAC52F}"/>
               </a:ext>
             </a:extLst>
           </p:cNvPr>
@@ -10185,7 +10136,7 @@
           <p:cNvPr id="2" name="Title 1">
             <a:extLst>
               <a:ext uri="{FF2B5EF4-FFF2-40B4-BE49-F238E27FC236}">
-                <a16:creationId xmlns="" xmlns:a16="http://schemas.microsoft.com/office/drawing/2014/main" id="{358DD9C9-8F33-7E4A-BB20-4A3F6AD77B5D}"/>
+                <a16:creationId xmlns:a16="http://schemas.microsoft.com/office/drawing/2014/main" xmlns="" id="{358DD9C9-8F33-7E4A-BB20-4A3F6AD77B5D}"/>
               </a:ext>
             </a:extLst>
           </p:cNvPr>
@@ -10213,7 +10164,7 @@
           <p:cNvPr id="6" name="Text Placeholder 5">
             <a:extLst>
               <a:ext uri="{FF2B5EF4-FFF2-40B4-BE49-F238E27FC236}">
-                <a16:creationId xmlns="" xmlns:a16="http://schemas.microsoft.com/office/drawing/2014/main" id="{33DE313B-952F-1E4C-AE6C-DE987F56F535}"/>
+                <a16:creationId xmlns:a16="http://schemas.microsoft.com/office/drawing/2014/main" xmlns="" id="{33DE313B-952F-1E4C-AE6C-DE987F56F535}"/>
               </a:ext>
             </a:extLst>
           </p:cNvPr>
@@ -10243,7 +10194,7 @@
           <p:cNvPr id="8" name="Text Placeholder 7">
             <a:extLst>
               <a:ext uri="{FF2B5EF4-FFF2-40B4-BE49-F238E27FC236}">
-                <a16:creationId xmlns="" xmlns:a16="http://schemas.microsoft.com/office/drawing/2014/main" id="{C537B1CD-2687-A74D-9CB8-34E12374C3FC}"/>
+                <a16:creationId xmlns:a16="http://schemas.microsoft.com/office/drawing/2014/main" xmlns="" id="{C537B1CD-2687-A74D-9CB8-34E12374C3FC}"/>
               </a:ext>
             </a:extLst>
           </p:cNvPr>
@@ -10273,7 +10224,7 @@
           <p:cNvPr id="10" name="Rectangle 9">
             <a:extLst>
               <a:ext uri="{FF2B5EF4-FFF2-40B4-BE49-F238E27FC236}">
-                <a16:creationId xmlns="" xmlns:a16="http://schemas.microsoft.com/office/drawing/2014/main" id="{D3256648-E5B4-7A4E-80CC-2D668B6CD5D2}"/>
+                <a16:creationId xmlns:a16="http://schemas.microsoft.com/office/drawing/2014/main" xmlns="" id="{D3256648-E5B4-7A4E-80CC-2D668B6CD5D2}"/>
               </a:ext>
             </a:extLst>
           </p:cNvPr>
@@ -10322,7 +10273,7 @@
           <p:cNvPr id="11" name="Rectangle 10">
             <a:extLst>
               <a:ext uri="{FF2B5EF4-FFF2-40B4-BE49-F238E27FC236}">
-                <a16:creationId xmlns="" xmlns:a16="http://schemas.microsoft.com/office/drawing/2014/main" id="{3815DE27-3230-0745-A0A7-FD0479EE2681}"/>
+                <a16:creationId xmlns:a16="http://schemas.microsoft.com/office/drawing/2014/main" xmlns="" id="{3815DE27-3230-0745-A0A7-FD0479EE2681}"/>
               </a:ext>
             </a:extLst>
           </p:cNvPr>
@@ -10371,7 +10322,7 @@
           <p:cNvPr id="13" name="TextBox 12">
             <a:extLst>
               <a:ext uri="{FF2B5EF4-FFF2-40B4-BE49-F238E27FC236}">
-                <a16:creationId xmlns="" xmlns:a16="http://schemas.microsoft.com/office/drawing/2014/main" id="{42FD6980-3EDE-2847-8349-F1AA40313C00}"/>
+                <a16:creationId xmlns:a16="http://schemas.microsoft.com/office/drawing/2014/main" xmlns="" id="{42FD6980-3EDE-2847-8349-F1AA40313C00}"/>
               </a:ext>
             </a:extLst>
           </p:cNvPr>
@@ -10407,7 +10358,7 @@
           <p:cNvPr id="15" name="Straight Connector 14">
             <a:extLst>
               <a:ext uri="{FF2B5EF4-FFF2-40B4-BE49-F238E27FC236}">
-                <a16:creationId xmlns="" xmlns:a16="http://schemas.microsoft.com/office/drawing/2014/main" id="{F1D691CA-1D10-634D-BF35-A6485C7982FF}"/>
+                <a16:creationId xmlns:a16="http://schemas.microsoft.com/office/drawing/2014/main" xmlns="" id="{F1D691CA-1D10-634D-BF35-A6485C7982FF}"/>
               </a:ext>
             </a:extLst>
           </p:cNvPr>
@@ -10451,7 +10402,7 @@
           <p:cNvPr id="16" name="Rectangle 15">
             <a:extLst>
               <a:ext uri="{FF2B5EF4-FFF2-40B4-BE49-F238E27FC236}">
-                <a16:creationId xmlns="" xmlns:a16="http://schemas.microsoft.com/office/drawing/2014/main" id="{77CD1CDC-491B-0D4C-AAFB-2E8EA3282914}"/>
+                <a16:creationId xmlns:a16="http://schemas.microsoft.com/office/drawing/2014/main" xmlns="" id="{77CD1CDC-491B-0D4C-AAFB-2E8EA3282914}"/>
               </a:ext>
             </a:extLst>
           </p:cNvPr>
@@ -10500,7 +10451,7 @@
           <p:cNvPr id="17" name="Rectangle 16">
             <a:extLst>
               <a:ext uri="{FF2B5EF4-FFF2-40B4-BE49-F238E27FC236}">
-                <a16:creationId xmlns="" xmlns:a16="http://schemas.microsoft.com/office/drawing/2014/main" id="{234663B7-ACA3-DD4B-8C70-90B4123D86D5}"/>
+                <a16:creationId xmlns:a16="http://schemas.microsoft.com/office/drawing/2014/main" xmlns="" id="{234663B7-ACA3-DD4B-8C70-90B4123D86D5}"/>
               </a:ext>
             </a:extLst>
           </p:cNvPr>
@@ -10549,7 +10500,7 @@
           <p:cNvPr id="23" name="Curved Connector 22">
             <a:extLst>
               <a:ext uri="{FF2B5EF4-FFF2-40B4-BE49-F238E27FC236}">
-                <a16:creationId xmlns="" xmlns:a16="http://schemas.microsoft.com/office/drawing/2014/main" id="{B12187BD-7BCE-E54A-AE76-8C910DB1A41D}"/>
+                <a16:creationId xmlns:a16="http://schemas.microsoft.com/office/drawing/2014/main" xmlns="" id="{B12187BD-7BCE-E54A-AE76-8C910DB1A41D}"/>
               </a:ext>
             </a:extLst>
           </p:cNvPr>
@@ -10594,7 +10545,7 @@
           <p:cNvPr id="25" name="Rectangle 24">
             <a:extLst>
               <a:ext uri="{FF2B5EF4-FFF2-40B4-BE49-F238E27FC236}">
-                <a16:creationId xmlns="" xmlns:a16="http://schemas.microsoft.com/office/drawing/2014/main" id="{04A1F68B-8FD7-2A40-9A6F-5EC96778ABA3}"/>
+                <a16:creationId xmlns:a16="http://schemas.microsoft.com/office/drawing/2014/main" xmlns="" id="{04A1F68B-8FD7-2A40-9A6F-5EC96778ABA3}"/>
               </a:ext>
             </a:extLst>
           </p:cNvPr>
@@ -10643,7 +10594,7 @@
           <p:cNvPr id="27" name="Rectangle 26">
             <a:extLst>
               <a:ext uri="{FF2B5EF4-FFF2-40B4-BE49-F238E27FC236}">
-                <a16:creationId xmlns="" xmlns:a16="http://schemas.microsoft.com/office/drawing/2014/main" id="{1320079D-53A3-B14C-A832-AD503BF156C5}"/>
+                <a16:creationId xmlns:a16="http://schemas.microsoft.com/office/drawing/2014/main" xmlns="" id="{1320079D-53A3-B14C-A832-AD503BF156C5}"/>
               </a:ext>
             </a:extLst>
           </p:cNvPr>
@@ -10692,7 +10643,7 @@
           <p:cNvPr id="28" name="Curved Connector 27">
             <a:extLst>
               <a:ext uri="{FF2B5EF4-FFF2-40B4-BE49-F238E27FC236}">
-                <a16:creationId xmlns="" xmlns:a16="http://schemas.microsoft.com/office/drawing/2014/main" id="{5B628F0E-A965-964F-B388-0AA841F54F35}"/>
+                <a16:creationId xmlns:a16="http://schemas.microsoft.com/office/drawing/2014/main" xmlns="" id="{5B628F0E-A965-964F-B388-0AA841F54F35}"/>
               </a:ext>
             </a:extLst>
           </p:cNvPr>
@@ -10738,7 +10689,7 @@
           <p:cNvPr id="31" name="Curved Connector 30">
             <a:extLst>
               <a:ext uri="{FF2B5EF4-FFF2-40B4-BE49-F238E27FC236}">
-                <a16:creationId xmlns="" xmlns:a16="http://schemas.microsoft.com/office/drawing/2014/main" id="{D6223184-A810-8C4E-8DD6-BDE3F8857DAF}"/>
+                <a16:creationId xmlns:a16="http://schemas.microsoft.com/office/drawing/2014/main" xmlns="" id="{D6223184-A810-8C4E-8DD6-BDE3F8857DAF}"/>
               </a:ext>
             </a:extLst>
           </p:cNvPr>
@@ -10784,7 +10735,7 @@
           <p:cNvPr id="34" name="Curved Connector 33">
             <a:extLst>
               <a:ext uri="{FF2B5EF4-FFF2-40B4-BE49-F238E27FC236}">
-                <a16:creationId xmlns="" xmlns:a16="http://schemas.microsoft.com/office/drawing/2014/main" id="{5FAAE7BA-4D42-A645-BEF3-2E796B982B4F}"/>
+                <a16:creationId xmlns:a16="http://schemas.microsoft.com/office/drawing/2014/main" xmlns="" id="{5FAAE7BA-4D42-A645-BEF3-2E796B982B4F}"/>
               </a:ext>
             </a:extLst>
           </p:cNvPr>

</xml_diff>